<commit_message>
changes to fig 5 6
</commit_message>
<xml_diff>
--- a/2020_fluxsat/figure_5_alternatives.pptx
+++ b/2020_fluxsat/figure_5_alternatives.pptx
@@ -247,7 +247,7 @@
           <a:p>
             <a:fld id="{153B1D05-B90C-47F0-9492-F213BDF00282}" type="datetimeFigureOut">
               <a:rPr lang="en-US" smtClean="0"/>
-              <a:t>5/8/20</a:t>
+              <a:t>5/21/2020</a:t>
             </a:fld>
             <a:endParaRPr lang="en-US"/>
           </a:p>
@@ -417,7 +417,7 @@
           <a:p>
             <a:fld id="{153B1D05-B90C-47F0-9492-F213BDF00282}" type="datetimeFigureOut">
               <a:rPr lang="en-US" smtClean="0"/>
-              <a:t>5/8/20</a:t>
+              <a:t>5/21/2020</a:t>
             </a:fld>
             <a:endParaRPr lang="en-US"/>
           </a:p>
@@ -597,7 +597,7 @@
           <a:p>
             <a:fld id="{153B1D05-B90C-47F0-9492-F213BDF00282}" type="datetimeFigureOut">
               <a:rPr lang="en-US" smtClean="0"/>
-              <a:t>5/8/20</a:t>
+              <a:t>5/21/2020</a:t>
             </a:fld>
             <a:endParaRPr lang="en-US"/>
           </a:p>
@@ -767,7 +767,7 @@
           <a:p>
             <a:fld id="{153B1D05-B90C-47F0-9492-F213BDF00282}" type="datetimeFigureOut">
               <a:rPr lang="en-US" smtClean="0"/>
-              <a:t>5/8/20</a:t>
+              <a:t>5/21/2020</a:t>
             </a:fld>
             <a:endParaRPr lang="en-US"/>
           </a:p>
@@ -1013,7 +1013,7 @@
           <a:p>
             <a:fld id="{153B1D05-B90C-47F0-9492-F213BDF00282}" type="datetimeFigureOut">
               <a:rPr lang="en-US" smtClean="0"/>
-              <a:t>5/8/20</a:t>
+              <a:t>5/21/2020</a:t>
             </a:fld>
             <a:endParaRPr lang="en-US"/>
           </a:p>
@@ -1245,7 +1245,7 @@
           <a:p>
             <a:fld id="{153B1D05-B90C-47F0-9492-F213BDF00282}" type="datetimeFigureOut">
               <a:rPr lang="en-US" smtClean="0"/>
-              <a:t>5/8/20</a:t>
+              <a:t>5/21/2020</a:t>
             </a:fld>
             <a:endParaRPr lang="en-US"/>
           </a:p>
@@ -1612,7 +1612,7 @@
           <a:p>
             <a:fld id="{153B1D05-B90C-47F0-9492-F213BDF00282}" type="datetimeFigureOut">
               <a:rPr lang="en-US" smtClean="0"/>
-              <a:t>5/8/20</a:t>
+              <a:t>5/21/2020</a:t>
             </a:fld>
             <a:endParaRPr lang="en-US"/>
           </a:p>
@@ -1730,7 +1730,7 @@
           <a:p>
             <a:fld id="{153B1D05-B90C-47F0-9492-F213BDF00282}" type="datetimeFigureOut">
               <a:rPr lang="en-US" smtClean="0"/>
-              <a:t>5/8/20</a:t>
+              <a:t>5/21/2020</a:t>
             </a:fld>
             <a:endParaRPr lang="en-US"/>
           </a:p>
@@ -1825,7 +1825,7 @@
           <a:p>
             <a:fld id="{153B1D05-B90C-47F0-9492-F213BDF00282}" type="datetimeFigureOut">
               <a:rPr lang="en-US" smtClean="0"/>
-              <a:t>5/8/20</a:t>
+              <a:t>5/21/2020</a:t>
             </a:fld>
             <a:endParaRPr lang="en-US"/>
           </a:p>
@@ -2102,7 +2102,7 @@
           <a:p>
             <a:fld id="{153B1D05-B90C-47F0-9492-F213BDF00282}" type="datetimeFigureOut">
               <a:rPr lang="en-US" smtClean="0"/>
-              <a:t>5/8/20</a:t>
+              <a:t>5/21/2020</a:t>
             </a:fld>
             <a:endParaRPr lang="en-US"/>
           </a:p>
@@ -2359,7 +2359,7 @@
           <a:p>
             <a:fld id="{153B1D05-B90C-47F0-9492-F213BDF00282}" type="datetimeFigureOut">
               <a:rPr lang="en-US" smtClean="0"/>
-              <a:t>5/8/20</a:t>
+              <a:t>5/21/2020</a:t>
             </a:fld>
             <a:endParaRPr lang="en-US"/>
           </a:p>
@@ -2572,7 +2572,7 @@
           <a:p>
             <a:fld id="{153B1D05-B90C-47F0-9492-F213BDF00282}" type="datetimeFigureOut">
               <a:rPr lang="en-US" smtClean="0"/>
-              <a:t>5/8/20</a:t>
+              <a:t>5/21/2020</a:t>
             </a:fld>
             <a:endParaRPr lang="en-US"/>
           </a:p>
@@ -3414,8 +3414,8 @@
           </a:p>
         </p:txBody>
       </p:sp>
-      <mc:AlternateContent xmlns:mc="http://schemas.openxmlformats.org/markup-compatibility/2006">
-        <mc:Choice xmlns:a14="http://schemas.microsoft.com/office/drawing/2010/main" Requires="a14">
+      <mc:AlternateContent xmlns:mc="http://schemas.openxmlformats.org/markup-compatibility/2006" xmlns:a14="http://schemas.microsoft.com/office/drawing/2010/main">
+        <mc:Choice Requires="a14">
           <p:sp>
             <p:nvSpPr>
               <p:cNvPr id="2" name="TextBox 1"/>
@@ -3566,7 +3566,7 @@
             </p:txBody>
           </p:sp>
         </mc:Choice>
-        <mc:Fallback>
+        <mc:Fallback xmlns="">
           <p:sp>
             <p:nvSpPr>
               <p:cNvPr id="2" name="TextBox 1"/>
@@ -4542,8 +4542,8 @@
           </a:p>
         </p:txBody>
       </p:sp>
-      <mc:AlternateContent xmlns:mc="http://schemas.openxmlformats.org/markup-compatibility/2006">
-        <mc:Choice xmlns:a14="http://schemas.microsoft.com/office/drawing/2010/main" Requires="a14">
+      <mc:AlternateContent xmlns:mc="http://schemas.openxmlformats.org/markup-compatibility/2006" xmlns:a14="http://schemas.microsoft.com/office/drawing/2010/main">
+        <mc:Choice Requires="a14">
           <p:sp>
             <p:nvSpPr>
               <p:cNvPr id="2" name="TextBox 1"/>
@@ -4694,7 +4694,7 @@
             </p:txBody>
           </p:sp>
         </mc:Choice>
-        <mc:Fallback>
+        <mc:Fallback xmlns="">
           <p:sp>
             <p:nvSpPr>
               <p:cNvPr id="2" name="TextBox 1"/>
@@ -5002,64 +5002,6 @@
       </p:sp>
       <p:sp>
         <p:nvSpPr>
-          <p:cNvPr id="29" name="Down Arrow 28"/>
-          <p:cNvSpPr/>
-          <p:nvPr/>
-        </p:nvSpPr>
-        <p:spPr>
-          <a:xfrm>
-            <a:off x="6061028" y="1016000"/>
-            <a:ext cx="167052" cy="468256"/>
-          </a:xfrm>
-          <a:prstGeom prst="downArrow">
-            <a:avLst/>
-          </a:prstGeom>
-          <a:solidFill>
-            <a:schemeClr val="tx1">
-              <a:lumMod val="65000"/>
-              <a:lumOff val="35000"/>
-            </a:schemeClr>
-          </a:solidFill>
-          <a:ln>
-            <a:noFill/>
-          </a:ln>
-        </p:spPr>
-        <p:style>
-          <a:lnRef idx="2">
-            <a:schemeClr val="accent1">
-              <a:shade val="50000"/>
-            </a:schemeClr>
-          </a:lnRef>
-          <a:fillRef idx="1">
-            <a:schemeClr val="accent1"/>
-          </a:fillRef>
-          <a:effectRef idx="0">
-            <a:schemeClr val="accent1"/>
-          </a:effectRef>
-          <a:fontRef idx="minor">
-            <a:schemeClr val="lt1"/>
-          </a:fontRef>
-        </p:style>
-        <p:txBody>
-          <a:bodyPr rot="0" spcFirstLastPara="0" vertOverflow="overflow" horzOverflow="overflow" vert="horz" wrap="square" lIns="91440" tIns="45720" rIns="91440" bIns="45720" numCol="1" spcCol="0" rtlCol="0" fromWordArt="0" anchor="ctr" anchorCtr="0" forceAA="0" compatLnSpc="1">
-            <a:prstTxWarp prst="textNoShape">
-              <a:avLst/>
-            </a:prstTxWarp>
-            <a:noAutofit/>
-          </a:bodyPr>
-          <a:lstStyle/>
-          <a:p>
-            <a:pPr algn="ctr"/>
-            <a:endParaRPr lang="en-US">
-              <a:solidFill>
-                <a:schemeClr val="tx1"/>
-              </a:solidFill>
-            </a:endParaRPr>
-          </a:p>
-        </p:txBody>
-      </p:sp>
-      <p:sp>
-        <p:nvSpPr>
           <p:cNvPr id="33" name="TextBox 32"/>
           <p:cNvSpPr txBox="1"/>
           <p:nvPr/>
@@ -5236,8 +5178,8 @@
           </a:p>
         </p:txBody>
       </p:sp>
-      <mc:AlternateContent xmlns:mc="http://schemas.openxmlformats.org/markup-compatibility/2006">
-        <mc:Choice xmlns:a14="http://schemas.microsoft.com/office/drawing/2010/main" Requires="a14">
+      <mc:AlternateContent xmlns:mc="http://schemas.openxmlformats.org/markup-compatibility/2006" xmlns:a14="http://schemas.microsoft.com/office/drawing/2010/main">
+        <mc:Choice Requires="a14">
           <p:sp>
             <p:nvSpPr>
               <p:cNvPr id="46" name="TextBox 45">
@@ -5287,7 +5229,7 @@
             </p:txBody>
           </p:sp>
         </mc:Choice>
-        <mc:Fallback>
+        <mc:Fallback xmlns="">
           <p:sp>
             <p:nvSpPr>
               <p:cNvPr id="46" name="TextBox 45">
@@ -5332,8 +5274,8 @@
           </p:sp>
         </mc:Fallback>
       </mc:AlternateContent>
-      <mc:AlternateContent xmlns:mc="http://schemas.openxmlformats.org/markup-compatibility/2006">
-        <mc:Choice xmlns:a14="http://schemas.microsoft.com/office/drawing/2010/main" Requires="a14">
+      <mc:AlternateContent xmlns:mc="http://schemas.openxmlformats.org/markup-compatibility/2006" xmlns:a14="http://schemas.microsoft.com/office/drawing/2010/main">
+        <mc:Choice Requires="a14">
           <p:sp>
             <p:nvSpPr>
               <p:cNvPr id="55" name="TextBox 54">
@@ -5383,7 +5325,7 @@
             </p:txBody>
           </p:sp>
         </mc:Choice>
-        <mc:Fallback>
+        <mc:Fallback xmlns="">
           <p:sp>
             <p:nvSpPr>
               <p:cNvPr id="55" name="TextBox 54">
@@ -5428,6 +5370,177 @@
           </p:sp>
         </mc:Fallback>
       </mc:AlternateContent>
+      <p:sp>
+        <p:nvSpPr>
+          <p:cNvPr id="27" name="Down Arrow 26">
+            <a:extLst>
+              <a:ext uri="{FF2B5EF4-FFF2-40B4-BE49-F238E27FC236}">
+                <a16:creationId xmlns:a16="http://schemas.microsoft.com/office/drawing/2014/main" id="{8BE1FC7B-5F9B-DC43-BFA7-E8997494DF9E}"/>
+              </a:ext>
+            </a:extLst>
+          </p:cNvPr>
+          <p:cNvSpPr/>
+          <p:nvPr/>
+        </p:nvSpPr>
+        <p:spPr>
+          <a:xfrm>
+            <a:off x="1755899" y="246983"/>
+            <a:ext cx="199536" cy="213162"/>
+          </a:xfrm>
+          <a:prstGeom prst="downArrow">
+            <a:avLst/>
+          </a:prstGeom>
+          <a:solidFill>
+            <a:schemeClr val="accent1"/>
+          </a:solidFill>
+          <a:ln/>
+        </p:spPr>
+        <p:style>
+          <a:lnRef idx="1">
+            <a:schemeClr val="accent1"/>
+          </a:lnRef>
+          <a:fillRef idx="2">
+            <a:schemeClr val="accent1"/>
+          </a:fillRef>
+          <a:effectRef idx="1">
+            <a:schemeClr val="accent1"/>
+          </a:effectRef>
+          <a:fontRef idx="minor">
+            <a:schemeClr val="dk1"/>
+          </a:fontRef>
+        </p:style>
+        <p:txBody>
+          <a:bodyPr rot="0" spcFirstLastPara="0" vertOverflow="overflow" horzOverflow="overflow" vert="horz" wrap="square" lIns="91440" tIns="45720" rIns="91440" bIns="45720" numCol="1" spcCol="0" rtlCol="0" fromWordArt="0" anchor="ctr" anchorCtr="0" forceAA="0" compatLnSpc="1">
+            <a:prstTxWarp prst="textNoShape">
+              <a:avLst/>
+            </a:prstTxWarp>
+            <a:noAutofit/>
+          </a:bodyPr>
+          <a:lstStyle/>
+          <a:p>
+            <a:pPr algn="ctr"/>
+            <a:endParaRPr lang="en-US">
+              <a:solidFill>
+                <a:schemeClr val="accent1"/>
+              </a:solidFill>
+            </a:endParaRPr>
+          </a:p>
+        </p:txBody>
+      </p:sp>
+      <p:sp>
+        <p:nvSpPr>
+          <p:cNvPr id="34" name="Down Arrow 33">
+            <a:extLst>
+              <a:ext uri="{FF2B5EF4-FFF2-40B4-BE49-F238E27FC236}">
+                <a16:creationId xmlns:a16="http://schemas.microsoft.com/office/drawing/2014/main" id="{8BE1FC7B-5F9B-DC43-BFA7-E8997494DF9E}"/>
+              </a:ext>
+            </a:extLst>
+          </p:cNvPr>
+          <p:cNvSpPr/>
+          <p:nvPr/>
+        </p:nvSpPr>
+        <p:spPr>
+          <a:xfrm>
+            <a:off x="3627574" y="257818"/>
+            <a:ext cx="199536" cy="202327"/>
+          </a:xfrm>
+          <a:prstGeom prst="downArrow">
+            <a:avLst/>
+          </a:prstGeom>
+          <a:solidFill>
+            <a:schemeClr val="accent1"/>
+          </a:solidFill>
+          <a:ln/>
+        </p:spPr>
+        <p:style>
+          <a:lnRef idx="1">
+            <a:schemeClr val="accent1"/>
+          </a:lnRef>
+          <a:fillRef idx="2">
+            <a:schemeClr val="accent1"/>
+          </a:fillRef>
+          <a:effectRef idx="1">
+            <a:schemeClr val="accent1"/>
+          </a:effectRef>
+          <a:fontRef idx="minor">
+            <a:schemeClr val="dk1"/>
+          </a:fontRef>
+        </p:style>
+        <p:txBody>
+          <a:bodyPr rot="0" spcFirstLastPara="0" vertOverflow="overflow" horzOverflow="overflow" vert="horz" wrap="square" lIns="91440" tIns="45720" rIns="91440" bIns="45720" numCol="1" spcCol="0" rtlCol="0" fromWordArt="0" anchor="ctr" anchorCtr="0" forceAA="0" compatLnSpc="1">
+            <a:prstTxWarp prst="textNoShape">
+              <a:avLst/>
+            </a:prstTxWarp>
+            <a:noAutofit/>
+          </a:bodyPr>
+          <a:lstStyle/>
+          <a:p>
+            <a:pPr algn="ctr"/>
+            <a:endParaRPr lang="en-US">
+              <a:solidFill>
+                <a:schemeClr val="accent1"/>
+              </a:solidFill>
+            </a:endParaRPr>
+          </a:p>
+        </p:txBody>
+      </p:sp>
+      <p:sp>
+        <p:nvSpPr>
+          <p:cNvPr id="35" name="Down Arrow 34">
+            <a:extLst>
+              <a:ext uri="{FF2B5EF4-FFF2-40B4-BE49-F238E27FC236}">
+                <a16:creationId xmlns:a16="http://schemas.microsoft.com/office/drawing/2014/main" id="{8BE1FC7B-5F9B-DC43-BFA7-E8997494DF9E}"/>
+              </a:ext>
+            </a:extLst>
+          </p:cNvPr>
+          <p:cNvSpPr/>
+          <p:nvPr/>
+        </p:nvSpPr>
+        <p:spPr>
+          <a:xfrm>
+            <a:off x="6048629" y="919686"/>
+            <a:ext cx="199536" cy="684031"/>
+          </a:xfrm>
+          <a:prstGeom prst="downArrow">
+            <a:avLst/>
+          </a:prstGeom>
+          <a:solidFill>
+            <a:schemeClr val="accent1"/>
+          </a:solidFill>
+          <a:ln/>
+        </p:spPr>
+        <p:style>
+          <a:lnRef idx="1">
+            <a:schemeClr val="accent1"/>
+          </a:lnRef>
+          <a:fillRef idx="2">
+            <a:schemeClr val="accent1"/>
+          </a:fillRef>
+          <a:effectRef idx="1">
+            <a:schemeClr val="accent1"/>
+          </a:effectRef>
+          <a:fontRef idx="minor">
+            <a:schemeClr val="dk1"/>
+          </a:fontRef>
+        </p:style>
+        <p:txBody>
+          <a:bodyPr rot="0" spcFirstLastPara="0" vertOverflow="overflow" horzOverflow="overflow" vert="horz" wrap="square" lIns="91440" tIns="45720" rIns="91440" bIns="45720" numCol="1" spcCol="0" rtlCol="0" fromWordArt="0" anchor="ctr" anchorCtr="0" forceAA="0" compatLnSpc="1">
+            <a:prstTxWarp prst="textNoShape">
+              <a:avLst/>
+            </a:prstTxWarp>
+            <a:noAutofit/>
+          </a:bodyPr>
+          <a:lstStyle/>
+          <a:p>
+            <a:pPr algn="ctr"/>
+            <a:endParaRPr lang="en-US">
+              <a:solidFill>
+                <a:schemeClr val="accent1"/>
+              </a:solidFill>
+            </a:endParaRPr>
+          </a:p>
+        </p:txBody>
+      </p:sp>
     </p:spTree>
     <p:extLst>
       <p:ext uri="{BB962C8B-B14F-4D97-AF65-F5344CB8AC3E}">

</xml_diff>